<commit_message>
index and ppt changes
</commit_message>
<xml_diff>
--- a/doc/how_to_create_csv_and_upload_students.pptx
+++ b/doc/how_to_create_csv_and_upload_students.pptx
@@ -397,6 +397,7 @@
           <a:p>
             <a:fld id="{0D23DB98-B8DB-F647-8EB2-AC746C197EE2}" type="datetimeFigureOut">
               <a:rPr lang="en-US" smtClean="0"/>
+              <a:pPr/>
               <a:t>12/2/12</a:t>
             </a:fld>
             <a:endParaRPr lang="en-US"/>
@@ -439,6 +440,7 @@
           <a:p>
             <a:fld id="{685FE13C-AFF0-654F-8B6A-9772DBC8A6B6}" type="slidenum">
               <a:rPr lang="en-US" smtClean="0"/>
+              <a:pPr/>
               <a:t>‹#›</a:t>
             </a:fld>
             <a:endParaRPr lang="en-US"/>
@@ -586,6 +588,7 @@
           <a:p>
             <a:fld id="{0D23DB98-B8DB-F647-8EB2-AC746C197EE2}" type="datetimeFigureOut">
               <a:rPr lang="en-US" smtClean="0"/>
+              <a:pPr/>
               <a:t>12/2/12</a:t>
             </a:fld>
             <a:endParaRPr lang="en-US"/>
@@ -628,6 +631,7 @@
           <a:p>
             <a:fld id="{685FE13C-AFF0-654F-8B6A-9772DBC8A6B6}" type="slidenum">
               <a:rPr lang="en-US" smtClean="0"/>
+              <a:pPr/>
               <a:t>‹#›</a:t>
             </a:fld>
             <a:endParaRPr lang="en-US"/>
@@ -851,6 +855,7 @@
           <a:p>
             <a:fld id="{0D23DB98-B8DB-F647-8EB2-AC746C197EE2}" type="datetimeFigureOut">
               <a:rPr lang="en-US" smtClean="0"/>
+              <a:pPr/>
               <a:t>12/2/12</a:t>
             </a:fld>
             <a:endParaRPr lang="en-US"/>
@@ -893,6 +898,7 @@
           <a:p>
             <a:fld id="{685FE13C-AFF0-654F-8B6A-9772DBC8A6B6}" type="slidenum">
               <a:rPr lang="en-US" smtClean="0"/>
+              <a:pPr/>
               <a:t>‹#›</a:t>
             </a:fld>
             <a:endParaRPr lang="en-US"/>
@@ -1026,6 +1032,7 @@
           <a:p>
             <a:fld id="{0D23DB98-B8DB-F647-8EB2-AC746C197EE2}" type="datetimeFigureOut">
               <a:rPr lang="en-US" smtClean="0"/>
+              <a:pPr/>
               <a:t>12/2/12</a:t>
             </a:fld>
             <a:endParaRPr lang="en-US"/>
@@ -1068,6 +1075,7 @@
           <a:p>
             <a:fld id="{685FE13C-AFF0-654F-8B6A-9772DBC8A6B6}" type="slidenum">
               <a:rPr lang="en-US" smtClean="0"/>
+              <a:pPr/>
               <a:t>‹#›</a:t>
             </a:fld>
             <a:endParaRPr lang="en-US"/>
@@ -1191,6 +1199,7 @@
           <a:p>
             <a:fld id="{0D23DB98-B8DB-F647-8EB2-AC746C197EE2}" type="datetimeFigureOut">
               <a:rPr lang="en-US" smtClean="0"/>
+              <a:pPr/>
               <a:t>12/2/12</a:t>
             </a:fld>
             <a:endParaRPr lang="en-US"/>
@@ -1233,6 +1242,7 @@
           <a:p>
             <a:fld id="{685FE13C-AFF0-654F-8B6A-9772DBC8A6B6}" type="slidenum">
               <a:rPr lang="en-US" smtClean="0"/>
+              <a:pPr/>
               <a:t>‹#›</a:t>
             </a:fld>
             <a:endParaRPr lang="en-US"/>
@@ -1433,6 +1443,7 @@
           <a:p>
             <a:fld id="{0D23DB98-B8DB-F647-8EB2-AC746C197EE2}" type="datetimeFigureOut">
               <a:rPr lang="en-US" smtClean="0"/>
+              <a:pPr/>
               <a:t>12/2/12</a:t>
             </a:fld>
             <a:endParaRPr lang="en-US"/>
@@ -1475,6 +1486,7 @@
           <a:p>
             <a:fld id="{685FE13C-AFF0-654F-8B6A-9772DBC8A6B6}" type="slidenum">
               <a:rPr lang="en-US" smtClean="0"/>
+              <a:pPr/>
               <a:t>‹#›</a:t>
             </a:fld>
             <a:endParaRPr lang="en-US"/>
@@ -1756,6 +1768,7 @@
           <a:p>
             <a:fld id="{0D23DB98-B8DB-F647-8EB2-AC746C197EE2}" type="datetimeFigureOut">
               <a:rPr lang="en-US" smtClean="0"/>
+              <a:pPr/>
               <a:t>12/2/12</a:t>
             </a:fld>
             <a:endParaRPr lang="en-US"/>
@@ -1798,6 +1811,7 @@
           <a:p>
             <a:fld id="{685FE13C-AFF0-654F-8B6A-9772DBC8A6B6}" type="slidenum">
               <a:rPr lang="en-US" smtClean="0"/>
+              <a:pPr/>
               <a:t>‹#›</a:t>
             </a:fld>
             <a:endParaRPr lang="en-US"/>
@@ -2054,6 +2068,7 @@
           <a:p>
             <a:fld id="{0D23DB98-B8DB-F647-8EB2-AC746C197EE2}" type="datetimeFigureOut">
               <a:rPr lang="en-US" smtClean="0"/>
+              <a:pPr/>
               <a:t>12/2/12</a:t>
             </a:fld>
             <a:endParaRPr lang="en-US"/>
@@ -2096,6 +2111,7 @@
           <a:p>
             <a:fld id="{685FE13C-AFF0-654F-8B6A-9772DBC8A6B6}" type="slidenum">
               <a:rPr lang="en-US" smtClean="0"/>
+              <a:pPr/>
               <a:t>‹#›</a:t>
             </a:fld>
             <a:endParaRPr lang="en-US"/>
@@ -2510,6 +2526,7 @@
           <a:p>
             <a:fld id="{0D23DB98-B8DB-F647-8EB2-AC746C197EE2}" type="datetimeFigureOut">
               <a:rPr lang="en-US" smtClean="0"/>
+              <a:pPr/>
               <a:t>12/2/12</a:t>
             </a:fld>
             <a:endParaRPr lang="en-US"/>
@@ -2552,6 +2569,7 @@
           <a:p>
             <a:fld id="{685FE13C-AFF0-654F-8B6A-9772DBC8A6B6}" type="slidenum">
               <a:rPr lang="en-US" smtClean="0"/>
+              <a:pPr/>
               <a:t>‹#›</a:t>
             </a:fld>
             <a:endParaRPr lang="en-US"/>
@@ -2623,6 +2641,7 @@
           <a:p>
             <a:fld id="{0D23DB98-B8DB-F647-8EB2-AC746C197EE2}" type="datetimeFigureOut">
               <a:rPr lang="en-US" smtClean="0"/>
+              <a:pPr/>
               <a:t>12/2/12</a:t>
             </a:fld>
             <a:endParaRPr lang="en-US"/>
@@ -2665,6 +2684,7 @@
           <a:p>
             <a:fld id="{685FE13C-AFF0-654F-8B6A-9772DBC8A6B6}" type="slidenum">
               <a:rPr lang="en-US" smtClean="0"/>
+              <a:pPr/>
               <a:t>‹#›</a:t>
             </a:fld>
             <a:endParaRPr lang="en-US"/>
@@ -2713,6 +2733,7 @@
           <a:p>
             <a:fld id="{0D23DB98-B8DB-F647-8EB2-AC746C197EE2}" type="datetimeFigureOut">
               <a:rPr lang="en-US" smtClean="0"/>
+              <a:pPr/>
               <a:t>12/2/12</a:t>
             </a:fld>
             <a:endParaRPr lang="en-US"/>
@@ -2755,6 +2776,7 @@
           <a:p>
             <a:fld id="{685FE13C-AFF0-654F-8B6A-9772DBC8A6B6}" type="slidenum">
               <a:rPr lang="en-US" smtClean="0"/>
+              <a:pPr/>
               <a:t>‹#›</a:t>
             </a:fld>
             <a:endParaRPr lang="en-US"/>
@@ -2992,6 +3014,7 @@
           <a:p>
             <a:fld id="{0D23DB98-B8DB-F647-8EB2-AC746C197EE2}" type="datetimeFigureOut">
               <a:rPr lang="en-US" smtClean="0"/>
+              <a:pPr/>
               <a:t>12/2/12</a:t>
             </a:fld>
             <a:endParaRPr lang="en-US"/>
@@ -3034,6 +3057,7 @@
           <a:p>
             <a:fld id="{685FE13C-AFF0-654F-8B6A-9772DBC8A6B6}" type="slidenum">
               <a:rPr lang="en-US" smtClean="0"/>
+              <a:pPr/>
               <a:t>‹#›</a:t>
             </a:fld>
             <a:endParaRPr lang="en-US"/>
@@ -3198,6 +3222,7 @@
           <a:p>
             <a:fld id="{0D23DB98-B8DB-F647-8EB2-AC746C197EE2}" type="datetimeFigureOut">
               <a:rPr lang="en-US" smtClean="0"/>
+              <a:pPr/>
               <a:t>12/2/12</a:t>
             </a:fld>
             <a:endParaRPr lang="en-US"/>
@@ -3272,6 +3297,7 @@
           <a:p>
             <a:fld id="{685FE13C-AFF0-654F-8B6A-9772DBC8A6B6}" type="slidenum">
               <a:rPr lang="en-US" smtClean="0"/>
+              <a:pPr/>
               <a:t>‹#›</a:t>
             </a:fld>
             <a:endParaRPr lang="en-US"/>
@@ -3755,7 +3781,11 @@
           <a:p>
             <a:r>
               <a:rPr lang="en-US" dirty="0" smtClean="0"/>
-              <a:t>Student id</a:t>
+              <a:t>Student </a:t>
+            </a:r>
+            <a:r>
+              <a:rPr lang="en-US" dirty="0" smtClean="0"/>
+              <a:t>id (If you don’t have this, just number them 1, 2, 3, etc…)</a:t>
             </a:r>
           </a:p>
           <a:p>

</xml_diff>

<commit_message>
Added and Modified a few powerpoints for documentation
Added teachercom presentation to replace teachcom
Changed and Modified a few slides in existing ppts
</commit_message>
<xml_diff>
--- a/doc/how_to_create_csv_and_upload_students.pptx
+++ b/doc/how_to_create_csv_and_upload_students.pptx
@@ -13,6 +13,8 @@
     <p:sldId id="261" r:id="rId7"/>
     <p:sldId id="262" r:id="rId8"/>
     <p:sldId id="263" r:id="rId9"/>
+    <p:sldId id="264" r:id="rId10"/>
+    <p:sldId id="265" r:id="rId11"/>
   </p:sldIdLst>
   <p:sldSz cx="9144000" cy="6858000" type="screen4x3"/>
   <p:notesSz cx="6858000" cy="9144000"/>
@@ -3702,6 +3704,55 @@
 </p:sld>
 </file>
 
+<file path=ppt/slides/slide10.xml><?xml version="1.0" encoding="utf-8"?>
+<p:sld xmlns:a="http://schemas.openxmlformats.org/drawingml/2006/main" xmlns:r="http://schemas.openxmlformats.org/officeDocument/2006/relationships" xmlns:mc="http://schemas.openxmlformats.org/markup-compatibility/2006" xmlns:mv="urn:schemas-microsoft-com:mac:vml" xmlns:p="http://schemas.openxmlformats.org/presentationml/2006/main" mc:Ignorable="mv" mc:PreserveAttributes="mv:*">
+  <p:cSld>
+    <p:spTree>
+      <p:nvGrpSpPr>
+        <p:cNvPr id="1" name=""/>
+        <p:cNvGrpSpPr/>
+        <p:nvPr/>
+      </p:nvGrpSpPr>
+      <p:grpSpPr>
+        <a:xfrm>
+          <a:off x="0" y="0"/>
+          <a:ext cx="0" cy="0"/>
+          <a:chOff x="0" y="0"/>
+          <a:chExt cx="0" cy="0"/>
+        </a:xfrm>
+      </p:grpSpPr>
+      <p:pic>
+        <p:nvPicPr>
+          <p:cNvPr id="2" name="Picture 1" descr="Step 8.png"/>
+          <p:cNvPicPr>
+            <a:picLocks noChangeAspect="1"/>
+          </p:cNvPicPr>
+          <p:nvPr/>
+        </p:nvPicPr>
+        <p:blipFill>
+          <a:blip r:embed="rId2"/>
+          <a:stretch>
+            <a:fillRect/>
+          </a:stretch>
+        </p:blipFill>
+        <p:spPr>
+          <a:xfrm>
+            <a:off x="0" y="1106499"/>
+            <a:ext cx="9144000" cy="2848857"/>
+          </a:xfrm>
+          <a:prstGeom prst="rect">
+            <a:avLst/>
+          </a:prstGeom>
+        </p:spPr>
+      </p:pic>
+    </p:spTree>
+  </p:cSld>
+  <p:clrMapOvr>
+    <a:masterClrMapping/>
+  </p:clrMapOvr>
+</p:sld>
+</file>
+
 <file path=ppt/slides/slide2.xml><?xml version="1.0" encoding="utf-8"?>
 <p:sld xmlns:a="http://schemas.openxmlformats.org/drawingml/2006/main" xmlns:r="http://schemas.openxmlformats.org/officeDocument/2006/relationships" xmlns:mc="http://schemas.openxmlformats.org/markup-compatibility/2006" xmlns:mv="urn:schemas-microsoft-com:mac:vml" xmlns:p="http://schemas.openxmlformats.org/presentationml/2006/main" mc:Ignorable="mv" mc:PreserveAttributes="mv:*">
   <p:cSld>
@@ -3781,11 +3832,7 @@
           <a:p>
             <a:r>
               <a:rPr lang="en-US" dirty="0" smtClean="0"/>
-              <a:t>Student </a:t>
-            </a:r>
-            <a:r>
-              <a:rPr lang="en-US" dirty="0" smtClean="0"/>
-              <a:t>id (If you don’t have this, just number them 1, 2, 3, etc…)</a:t>
+              <a:t>Student id (If you don’t have this, just number them 1, 2, 3, etc…)</a:t>
             </a:r>
           </a:p>
           <a:p>
@@ -4139,6 +4186,55 @@
 </p:sld>
 </file>
 
+<file path=ppt/slides/slide9.xml><?xml version="1.0" encoding="utf-8"?>
+<p:sld xmlns:a="http://schemas.openxmlformats.org/drawingml/2006/main" xmlns:r="http://schemas.openxmlformats.org/officeDocument/2006/relationships" xmlns:mc="http://schemas.openxmlformats.org/markup-compatibility/2006" xmlns:mv="urn:schemas-microsoft-com:mac:vml" xmlns:p="http://schemas.openxmlformats.org/presentationml/2006/main" mc:Ignorable="mv" mc:PreserveAttributes="mv:*">
+  <p:cSld>
+    <p:spTree>
+      <p:nvGrpSpPr>
+        <p:cNvPr id="1" name=""/>
+        <p:cNvGrpSpPr/>
+        <p:nvPr/>
+      </p:nvGrpSpPr>
+      <p:grpSpPr>
+        <a:xfrm>
+          <a:off x="0" y="0"/>
+          <a:ext cx="0" cy="0"/>
+          <a:chOff x="0" y="0"/>
+          <a:chExt cx="0" cy="0"/>
+        </a:xfrm>
+      </p:grpSpPr>
+      <p:pic>
+        <p:nvPicPr>
+          <p:cNvPr id="3" name="Picture 2" descr="Step 7.png"/>
+          <p:cNvPicPr>
+            <a:picLocks noChangeAspect="1"/>
+          </p:cNvPicPr>
+          <p:nvPr/>
+        </p:nvPicPr>
+        <p:blipFill>
+          <a:blip r:embed="rId2"/>
+          <a:stretch>
+            <a:fillRect/>
+          </a:stretch>
+        </p:blipFill>
+        <p:spPr>
+          <a:xfrm>
+            <a:off x="0" y="943429"/>
+            <a:ext cx="9144000" cy="2925642"/>
+          </a:xfrm>
+          <a:prstGeom prst="rect">
+            <a:avLst/>
+          </a:prstGeom>
+        </p:spPr>
+      </p:pic>
+    </p:spTree>
+  </p:cSld>
+  <p:clrMapOvr>
+    <a:masterClrMapping/>
+  </p:clrMapOvr>
+</p:sld>
+</file>
+
 <file path=ppt/theme/theme1.xml><?xml version="1.0" encoding="utf-8"?>
 <a:theme xmlns:a="http://schemas.openxmlformats.org/drawingml/2006/main" name="Breeze">
   <a:themeElements>

</xml_diff>